<commit_message>
fix the login and back button
</commit_message>
<xml_diff>
--- a/lighteningtalk.pptx
+++ b/lighteningtalk.pptx
@@ -111,6 +111,11 @@
       </a:defRPr>
     </a:lvl9pPr>
   </p:defaultTextStyle>
+  <p:extLst>
+    <p:ext uri="{EFAFB233-063F-42B5-8137-9DF3F51BA10A}">
+      <p15:sldGuideLst xmlns:p15="http://schemas.microsoft.com/office/powerpoint/2012/main"/>
+    </p:ext>
+  </p:extLst>
 </p:presentation>
 </file>
 
@@ -3958,7 +3963,7 @@
       </p:pic>
       <p:pic>
         <p:nvPicPr>
-          <p:cNvPr id="4" name="Content Placeholder 3"/>
+          <p:cNvPr id="5" name="Content Placeholder 4"/>
           <p:cNvPicPr>
             <a:picLocks noGrp="1" noChangeAspect="1"/>
           </p:cNvPicPr>
@@ -3980,8 +3985,8 @@
         </p:blipFill>
         <p:spPr>
           <a:xfrm>
-            <a:off x="5998214" y="1948718"/>
-            <a:ext cx="3145786" cy="4105654"/>
+            <a:off x="5924010" y="1948718"/>
+            <a:ext cx="3219990" cy="4351338"/>
           </a:xfrm>
         </p:spPr>
       </p:pic>

</xml_diff>